<commit_message>
Vor- und Nachteile eingefügt
</commit_message>
<xml_diff>
--- a/Projekt-Präsentation.pptx
+++ b/Projekt-Präsentation.pptx
@@ -4067,7 +4067,7 @@
                   <a:schemeClr val="tx1"/>
                 </a:solidFill>
               </a:rPr>
-              <a:t>Angewandte „Optionen“</a:t>
+              <a:t>Vorteile und Nachteile</a:t>
             </a:r>
             <a:endParaRPr lang="de-DE" dirty="0">
               <a:solidFill>
@@ -4079,12 +4079,12 @@
       </p:sp>
       <p:sp>
         <p:nvSpPr>
-          <p:cNvPr id="3" name="Inhaltsplatzhalter 2"/>
-          <p:cNvSpPr>
-            <a:spLocks noGrp="1"/>
-          </p:cNvSpPr>
-          <p:nvPr>
-            <p:ph idx="1"/>
+          <p:cNvPr id="7" name="Textplatzhalter 6"/>
+          <p:cNvSpPr>
+            <a:spLocks noGrp="1"/>
+          </p:cNvSpPr>
+          <p:nvPr>
+            <p:ph type="body" idx="1"/>
           </p:nvPr>
         </p:nvSpPr>
         <p:spPr/>
@@ -4095,30 +4095,13 @@
           <a:lstStyle/>
           <a:p>
             <a:r>
-              <a:rPr lang="de-DE" sz="2400" dirty="0" err="1" smtClean="0">
-                <a:solidFill>
-                  <a:schemeClr val="tx1"/>
-                </a:solidFill>
-                <a:latin typeface="Calibri Light" panose="020F0302020204030204" pitchFamily="34" charset="0"/>
-              </a:rPr>
-              <a:t>JTable</a:t>
-            </a:r>
-            <a:endParaRPr lang="de-DE" sz="2400" dirty="0" smtClean="0">
-              <a:solidFill>
-                <a:schemeClr val="tx1"/>
-              </a:solidFill>
-              <a:latin typeface="Calibri Light" panose="020F0302020204030204" pitchFamily="34" charset="0"/>
-            </a:endParaRPr>
-          </a:p>
-          <a:p>
-            <a:r>
-              <a:rPr lang="de-DE" sz="2400" dirty="0" err="1" smtClean="0">
-                <a:solidFill>
-                  <a:schemeClr val="tx1"/>
-                </a:solidFill>
-                <a:latin typeface="Calibri Light" panose="020F0302020204030204" pitchFamily="34" charset="0"/>
-              </a:rPr>
-              <a:t>PasswordField</a:t>
+              <a:rPr lang="de-DE" sz="2400" dirty="0" smtClean="0">
+                <a:solidFill>
+                  <a:schemeClr val="tx1"/>
+                </a:solidFill>
+                <a:latin typeface="Calibri Light" panose="020F0302020204030204" pitchFamily="34" charset="0"/>
+              </a:rPr>
+              <a:t>Vorteile</a:t>
             </a:r>
             <a:endParaRPr lang="de-DE" sz="2400" dirty="0">
               <a:solidFill>
@@ -4126,6 +4109,153 @@
               </a:solidFill>
               <a:latin typeface="Calibri Light" panose="020F0302020204030204" pitchFamily="34" charset="0"/>
             </a:endParaRPr>
+          </a:p>
+        </p:txBody>
+      </p:sp>
+      <p:sp>
+        <p:nvSpPr>
+          <p:cNvPr id="3" name="Inhaltsplatzhalter 2"/>
+          <p:cNvSpPr>
+            <a:spLocks noGrp="1"/>
+          </p:cNvSpPr>
+          <p:nvPr>
+            <p:ph sz="half" idx="2"/>
+          </p:nvPr>
+        </p:nvSpPr>
+        <p:spPr/>
+        <p:txBody>
+          <a:bodyPr>
+            <a:normAutofit/>
+          </a:bodyPr>
+          <a:lstStyle/>
+          <a:p>
+            <a:r>
+              <a:rPr lang="de-DE" sz="2400" dirty="0" smtClean="0">
+                <a:solidFill>
+                  <a:schemeClr val="tx1"/>
+                </a:solidFill>
+                <a:latin typeface="Calibri Light" panose="020F0302020204030204" pitchFamily="34" charset="0"/>
+              </a:rPr>
+              <a:t>Einfache Verwaltung</a:t>
+            </a:r>
+          </a:p>
+          <a:p>
+            <a:r>
+              <a:rPr lang="de-DE" sz="2400" dirty="0" smtClean="0">
+                <a:solidFill>
+                  <a:schemeClr val="tx1"/>
+                </a:solidFill>
+                <a:latin typeface="Calibri Light" panose="020F0302020204030204" pitchFamily="34" charset="0"/>
+              </a:rPr>
+              <a:t>Alles Wichtige auf einem Blick</a:t>
+            </a:r>
+          </a:p>
+          <a:p>
+            <a:r>
+              <a:rPr lang="de-DE" sz="2400" dirty="0" smtClean="0">
+                <a:solidFill>
+                  <a:schemeClr val="tx1"/>
+                </a:solidFill>
+                <a:latin typeface="Calibri Light" panose="020F0302020204030204" pitchFamily="34" charset="0"/>
+              </a:rPr>
+              <a:t>Benutzerfreundlich</a:t>
+            </a:r>
+          </a:p>
+          <a:p>
+            <a:endParaRPr lang="de-DE" sz="2400" dirty="0">
+              <a:solidFill>
+                <a:schemeClr val="tx1"/>
+              </a:solidFill>
+              <a:latin typeface="Calibri Light" panose="020F0302020204030204" pitchFamily="34" charset="0"/>
+            </a:endParaRPr>
+          </a:p>
+        </p:txBody>
+      </p:sp>
+      <p:sp>
+        <p:nvSpPr>
+          <p:cNvPr id="8" name="Textplatzhalter 7"/>
+          <p:cNvSpPr>
+            <a:spLocks noGrp="1"/>
+          </p:cNvSpPr>
+          <p:nvPr>
+            <p:ph type="body" sz="quarter" idx="3"/>
+          </p:nvPr>
+        </p:nvSpPr>
+        <p:spPr/>
+        <p:txBody>
+          <a:bodyPr>
+            <a:normAutofit/>
+          </a:bodyPr>
+          <a:lstStyle/>
+          <a:p>
+            <a:r>
+              <a:rPr lang="de-DE" sz="2400" dirty="0" smtClean="0">
+                <a:solidFill>
+                  <a:schemeClr val="tx1"/>
+                </a:solidFill>
+                <a:latin typeface="Calibri Light" panose="020F0302020204030204" pitchFamily="34" charset="0"/>
+              </a:rPr>
+              <a:t>Nachteile</a:t>
+            </a:r>
+            <a:endParaRPr lang="de-DE" sz="2400" dirty="0">
+              <a:solidFill>
+                <a:schemeClr val="tx1"/>
+              </a:solidFill>
+              <a:latin typeface="Calibri Light" panose="020F0302020204030204" pitchFamily="34" charset="0"/>
+            </a:endParaRPr>
+          </a:p>
+        </p:txBody>
+      </p:sp>
+      <p:sp>
+        <p:nvSpPr>
+          <p:cNvPr id="9" name="Inhaltsplatzhalter 8"/>
+          <p:cNvSpPr>
+            <a:spLocks noGrp="1"/>
+          </p:cNvSpPr>
+          <p:nvPr>
+            <p:ph sz="quarter" idx="4"/>
+          </p:nvPr>
+        </p:nvSpPr>
+        <p:spPr/>
+        <p:txBody>
+          <a:bodyPr>
+            <a:normAutofit/>
+          </a:bodyPr>
+          <a:lstStyle/>
+          <a:p>
+            <a:r>
+              <a:rPr lang="de-DE" sz="2400" dirty="0" smtClean="0">
+                <a:solidFill>
+                  <a:schemeClr val="tx1"/>
+                </a:solidFill>
+                <a:latin typeface="Calibri Light" panose="020F0302020204030204" pitchFamily="34" charset="0"/>
+              </a:rPr>
+              <a:t>Noch nicht fertig</a:t>
+            </a:r>
+          </a:p>
+          <a:p>
+            <a:pPr lvl="1"/>
+            <a:r>
+              <a:rPr lang="de-DE" sz="2400" dirty="0" smtClean="0">
+                <a:solidFill>
+                  <a:schemeClr val="tx1"/>
+                </a:solidFill>
+                <a:latin typeface="Calibri Light" panose="020F0302020204030204" pitchFamily="34" charset="0"/>
+              </a:rPr>
+              <a:t>Anzeigefehler</a:t>
+            </a:r>
+          </a:p>
+          <a:p>
+            <a:pPr lvl="1"/>
+            <a:r>
+              <a:rPr lang="de-DE" sz="2400" dirty="0" smtClean="0">
+                <a:solidFill>
+                  <a:schemeClr val="tx1"/>
+                </a:solidFill>
+                <a:latin typeface="Calibri Light" panose="020F0302020204030204" pitchFamily="34" charset="0"/>
+              </a:rPr>
+              <a:t>Einteilung der Zeitblöcke</a:t>
+            </a:r>
           </a:p>
         </p:txBody>
       </p:sp>

</xml_diff>